<commit_message>
Commit pour création dossier Distributed System
</commit_message>
<xml_diff>
--- a/Digital Speech Processing/Project/Diapo/MPA-Mid presentation.pptx
+++ b/Digital Speech Processing/Project/Diapo/MPA-Mid presentation.pptx
@@ -8,13 +8,16 @@
     <p:sldId id="256" r:id="rId2"/>
     <p:sldId id="257" r:id="rId3"/>
     <p:sldId id="258" r:id="rId4"/>
-    <p:sldId id="259" r:id="rId5"/>
-    <p:sldId id="260" r:id="rId6"/>
-    <p:sldId id="261" r:id="rId7"/>
-    <p:sldId id="262" r:id="rId8"/>
-    <p:sldId id="263" r:id="rId9"/>
-    <p:sldId id="264" r:id="rId10"/>
-    <p:sldId id="265" r:id="rId11"/>
+    <p:sldId id="266" r:id="rId5"/>
+    <p:sldId id="259" r:id="rId6"/>
+    <p:sldId id="260" r:id="rId7"/>
+    <p:sldId id="261" r:id="rId8"/>
+    <p:sldId id="262" r:id="rId9"/>
+    <p:sldId id="263" r:id="rId10"/>
+    <p:sldId id="267" r:id="rId11"/>
+    <p:sldId id="264" r:id="rId12"/>
+    <p:sldId id="265" r:id="rId13"/>
+    <p:sldId id="268" r:id="rId14"/>
   </p:sldIdLst>
   <p:sldSz cx="9144000" cy="6858000" type="screen4x3"/>
   <p:notesSz cx="7099300" cy="10234613"/>
@@ -259,7 +262,8 @@
           <a:p>
             <a:fld id="{38A56B83-AACF-4C67-A4A1-D2BDCBF97542}" type="datetimeFigureOut">
               <a:rPr lang="fr-FR" smtClean="0"/>
-              <a:t>03/12/2008</a:t>
+              <a:pPr/>
+              <a:t>04/12/2008</a:t>
             </a:fld>
             <a:endParaRPr lang="en-US"/>
           </a:p>
@@ -311,6 +315,7 @@
           <a:p>
             <a:fld id="{E65B1001-7E5E-451D-AEAC-53642AE4E455}" type="slidenum">
               <a:rPr lang="en-US" smtClean="0"/>
+              <a:pPr/>
               <a:t>‹N°›</a:t>
             </a:fld>
             <a:endParaRPr lang="en-US"/>
@@ -618,7 +623,8 @@
           <a:p>
             <a:fld id="{38A56B83-AACF-4C67-A4A1-D2BDCBF97542}" type="datetimeFigureOut">
               <a:rPr lang="fr-FR" smtClean="0"/>
-              <a:t>03/12/2008</a:t>
+              <a:pPr/>
+              <a:t>04/12/2008</a:t>
             </a:fld>
             <a:endParaRPr lang="en-US"/>
           </a:p>
@@ -660,6 +666,7 @@
           <a:p>
             <a:fld id="{E65B1001-7E5E-451D-AEAC-53642AE4E455}" type="slidenum">
               <a:rPr lang="en-US" smtClean="0"/>
+              <a:pPr/>
               <a:t>‹N°›</a:t>
             </a:fld>
             <a:endParaRPr lang="en-US"/>
@@ -793,7 +800,8 @@
           <a:p>
             <a:fld id="{38A56B83-AACF-4C67-A4A1-D2BDCBF97542}" type="datetimeFigureOut">
               <a:rPr lang="fr-FR" smtClean="0"/>
-              <a:t>03/12/2008</a:t>
+              <a:pPr/>
+              <a:t>04/12/2008</a:t>
             </a:fld>
             <a:endParaRPr lang="en-US"/>
           </a:p>
@@ -835,6 +843,7 @@
           <a:p>
             <a:fld id="{E65B1001-7E5E-451D-AEAC-53642AE4E455}" type="slidenum">
               <a:rPr lang="en-US" smtClean="0"/>
+              <a:pPr/>
               <a:t>‹N°›</a:t>
             </a:fld>
             <a:endParaRPr lang="en-US"/>
@@ -1028,7 +1037,8 @@
           <a:p>
             <a:fld id="{38A56B83-AACF-4C67-A4A1-D2BDCBF97542}" type="datetimeFigureOut">
               <a:rPr lang="fr-FR" smtClean="0"/>
-              <a:t>03/12/2008</a:t>
+              <a:pPr/>
+              <a:t>04/12/2008</a:t>
             </a:fld>
             <a:endParaRPr lang="en-US"/>
           </a:p>
@@ -1070,6 +1080,7 @@
           <a:p>
             <a:fld id="{E65B1001-7E5E-451D-AEAC-53642AE4E455}" type="slidenum">
               <a:rPr lang="en-US" smtClean="0"/>
+              <a:pPr/>
               <a:t>‹N°›</a:t>
             </a:fld>
             <a:endParaRPr lang="en-US"/>
@@ -1297,7 +1308,8 @@
           <a:p>
             <a:fld id="{38A56B83-AACF-4C67-A4A1-D2BDCBF97542}" type="datetimeFigureOut">
               <a:rPr lang="fr-FR" smtClean="0"/>
-              <a:t>03/12/2008</a:t>
+              <a:pPr/>
+              <a:t>04/12/2008</a:t>
             </a:fld>
             <a:endParaRPr lang="en-US"/>
           </a:p>
@@ -1349,6 +1361,7 @@
           <a:p>
             <a:fld id="{E65B1001-7E5E-451D-AEAC-53642AE4E455}" type="slidenum">
               <a:rPr lang="en-US" smtClean="0"/>
+              <a:pPr/>
               <a:t>‹N°›</a:t>
             </a:fld>
             <a:endParaRPr lang="en-US"/>
@@ -1517,7 +1530,8 @@
           <a:p>
             <a:fld id="{38A56B83-AACF-4C67-A4A1-D2BDCBF97542}" type="datetimeFigureOut">
               <a:rPr lang="fr-FR" smtClean="0"/>
-              <a:t>03/12/2008</a:t>
+              <a:pPr/>
+              <a:t>04/12/2008</a:t>
             </a:fld>
             <a:endParaRPr lang="en-US"/>
           </a:p>
@@ -1559,6 +1573,7 @@
           <a:p>
             <a:fld id="{E65B1001-7E5E-451D-AEAC-53642AE4E455}" type="slidenum">
               <a:rPr lang="en-US" smtClean="0"/>
+              <a:pPr/>
               <a:t>‹N°›</a:t>
             </a:fld>
             <a:endParaRPr lang="en-US"/>
@@ -1869,7 +1884,8 @@
           <a:p>
             <a:fld id="{38A56B83-AACF-4C67-A4A1-D2BDCBF97542}" type="datetimeFigureOut">
               <a:rPr lang="fr-FR" smtClean="0"/>
-              <a:t>03/12/2008</a:t>
+              <a:pPr/>
+              <a:t>04/12/2008</a:t>
             </a:fld>
             <a:endParaRPr lang="en-US"/>
           </a:p>
@@ -1911,6 +1927,7 @@
           <a:p>
             <a:fld id="{E65B1001-7E5E-451D-AEAC-53642AE4E455}" type="slidenum">
               <a:rPr lang="en-US" smtClean="0"/>
+              <a:pPr/>
               <a:t>‹N°›</a:t>
             </a:fld>
             <a:endParaRPr lang="en-US"/>
@@ -2101,7 +2118,8 @@
           <a:p>
             <a:fld id="{38A56B83-AACF-4C67-A4A1-D2BDCBF97542}" type="datetimeFigureOut">
               <a:rPr lang="fr-FR" smtClean="0"/>
-              <a:t>03/12/2008</a:t>
+              <a:pPr/>
+              <a:t>04/12/2008</a:t>
             </a:fld>
             <a:endParaRPr lang="en-US"/>
           </a:p>
@@ -2143,6 +2161,7 @@
           <a:p>
             <a:fld id="{E65B1001-7E5E-451D-AEAC-53642AE4E455}" type="slidenum">
               <a:rPr lang="en-US" smtClean="0"/>
+              <a:pPr/>
               <a:t>‹N°›</a:t>
             </a:fld>
             <a:endParaRPr lang="en-US"/>
@@ -2241,7 +2260,8 @@
           <a:p>
             <a:fld id="{38A56B83-AACF-4C67-A4A1-D2BDCBF97542}" type="datetimeFigureOut">
               <a:rPr lang="fr-FR" smtClean="0"/>
-              <a:t>03/12/2008</a:t>
+              <a:pPr/>
+              <a:t>04/12/2008</a:t>
             </a:fld>
             <a:endParaRPr lang="en-US"/>
           </a:p>
@@ -2283,6 +2303,7 @@
           <a:p>
             <a:fld id="{E65B1001-7E5E-451D-AEAC-53642AE4E455}" type="slidenum">
               <a:rPr lang="en-US" smtClean="0"/>
+              <a:pPr/>
               <a:t>‹N°›</a:t>
             </a:fld>
             <a:endParaRPr lang="en-US"/>
@@ -2518,7 +2539,8 @@
           <a:p>
             <a:fld id="{38A56B83-AACF-4C67-A4A1-D2BDCBF97542}" type="datetimeFigureOut">
               <a:rPr lang="fr-FR" smtClean="0"/>
-              <a:t>03/12/2008</a:t>
+              <a:pPr/>
+              <a:t>04/12/2008</a:t>
             </a:fld>
             <a:endParaRPr lang="en-US"/>
           </a:p>
@@ -2560,6 +2582,7 @@
           <a:p>
             <a:fld id="{E65B1001-7E5E-451D-AEAC-53642AE4E455}" type="slidenum">
               <a:rPr lang="en-US" smtClean="0"/>
+              <a:pPr/>
               <a:t>‹N°›</a:t>
             </a:fld>
             <a:endParaRPr lang="en-US"/>
@@ -2925,7 +2948,8 @@
           <a:p>
             <a:fld id="{38A56B83-AACF-4C67-A4A1-D2BDCBF97542}" type="datetimeFigureOut">
               <a:rPr lang="fr-FR" smtClean="0"/>
-              <a:t>03/12/2008</a:t>
+              <a:pPr/>
+              <a:t>04/12/2008</a:t>
             </a:fld>
             <a:endParaRPr lang="en-US"/>
           </a:p>
@@ -2967,6 +2991,7 @@
           <a:p>
             <a:fld id="{E65B1001-7E5E-451D-AEAC-53642AE4E455}" type="slidenum">
               <a:rPr lang="en-US" smtClean="0"/>
+              <a:pPr/>
               <a:t>‹N°›</a:t>
             </a:fld>
             <a:endParaRPr lang="en-US"/>
@@ -3263,7 +3288,8 @@
           <a:p>
             <a:fld id="{38A56B83-AACF-4C67-A4A1-D2BDCBF97542}" type="datetimeFigureOut">
               <a:rPr lang="fr-FR" smtClean="0"/>
-              <a:t>03/12/2008</a:t>
+              <a:pPr/>
+              <a:t>04/12/2008</a:t>
             </a:fld>
             <a:endParaRPr lang="en-US"/>
           </a:p>
@@ -3337,6 +3363,7 @@
           <a:p>
             <a:fld id="{E65B1001-7E5E-451D-AEAC-53642AE4E455}" type="slidenum">
               <a:rPr lang="en-US" smtClean="0"/>
+              <a:pPr/>
               <a:t>‹N°›</a:t>
             </a:fld>
             <a:endParaRPr lang="en-US"/>
@@ -3928,8 +3955,12 @@
           <a:lstStyle/>
           <a:p>
             <a:r>
-              <a:rPr lang="en-US" dirty="0" smtClean="0"/>
-              <a:t>Summarize: What I Have done so far ?</a:t>
+              <a:rPr lang="en-US" dirty="0" err="1" smtClean="0"/>
+              <a:t>Exemple</a:t>
+            </a:r>
+            <a:r>
+              <a:rPr lang="en-US" dirty="0" smtClean="0"/>
+              <a:t> of the Algorithm:</a:t>
             </a:r>
             <a:endParaRPr lang="en-US" dirty="0"/>
           </a:p>
@@ -3945,6 +3976,375 @@
             <p:ph sz="quarter" idx="1"/>
           </p:nvPr>
         </p:nvSpPr>
+        <p:spPr>
+          <a:xfrm>
+            <a:off x="457200" y="1219200"/>
+            <a:ext cx="8229600" cy="4781568"/>
+          </a:xfrm>
+        </p:spPr>
+        <p:txBody>
+          <a:bodyPr>
+            <a:normAutofit fontScale="70000" lnSpcReduction="20000"/>
+          </a:bodyPr>
+          <a:lstStyle/>
+          <a:p>
+            <a:r>
+              <a:rPr lang="en-US" dirty="0" smtClean="0"/>
+              <a:t>We apply the DCT to an audio frame:</a:t>
+            </a:r>
+          </a:p>
+          <a:p>
+            <a:pPr lvl="1"/>
+            <a:r>
+              <a:rPr lang="en-US" dirty="0" smtClean="0"/>
+              <a:t>F={2,4,3,4,4,5,5,1,0,0,3,8} of size N=12</a:t>
+            </a:r>
+          </a:p>
+          <a:p>
+            <a:pPr lvl="1"/>
+            <a:endParaRPr lang="en-US" dirty="0" smtClean="0"/>
+          </a:p>
+          <a:p>
+            <a:r>
+              <a:rPr lang="en-US" dirty="0" smtClean="0"/>
+              <a:t>Random Generation of the Index I representing 0</a:t>
+            </a:r>
+          </a:p>
+          <a:p>
+            <a:pPr lvl="1"/>
+            <a:r>
+              <a:rPr lang="en-US" dirty="0" smtClean="0"/>
+              <a:t>I={2,4,5,9} of size 2n=4 (We keep that in memory)</a:t>
+            </a:r>
+          </a:p>
+          <a:p>
+            <a:pPr lvl="2"/>
+            <a:r>
+              <a:rPr lang="en-US" dirty="0" smtClean="0"/>
+              <a:t>Elements of I are &gt;1 and &lt;N=12</a:t>
+            </a:r>
+          </a:p>
+          <a:p>
+            <a:pPr lvl="1"/>
+            <a:endParaRPr lang="en-US" dirty="0" smtClean="0"/>
+          </a:p>
+          <a:p>
+            <a:r>
+              <a:rPr lang="en-US" dirty="0" smtClean="0"/>
+              <a:t>We extract the coefficient of F, with subscript in I.</a:t>
+            </a:r>
+          </a:p>
+          <a:p>
+            <a:pPr lvl="1"/>
+            <a:r>
+              <a:rPr lang="en-US" dirty="0" smtClean="0"/>
+              <a:t>A={4,4} ( 2th  and 4</a:t>
+            </a:r>
+            <a:r>
+              <a:rPr lang="en-US" baseline="30000" dirty="0" smtClean="0"/>
+              <a:t>th</a:t>
+            </a:r>
+            <a:r>
+              <a:rPr lang="en-US" dirty="0" smtClean="0"/>
+              <a:t> </a:t>
+            </a:r>
+            <a:r>
+              <a:rPr lang="en-US" dirty="0" err="1" smtClean="0"/>
+              <a:t>coeff</a:t>
+            </a:r>
+            <a:r>
+              <a:rPr lang="en-US" dirty="0" smtClean="0"/>
+              <a:t> of F according to first n elements of I) and B={4,0} (5</a:t>
+            </a:r>
+            <a:r>
+              <a:rPr lang="en-US" baseline="30000" dirty="0" smtClean="0"/>
+              <a:t>th</a:t>
+            </a:r>
+            <a:r>
+              <a:rPr lang="en-US" dirty="0" smtClean="0"/>
+              <a:t> and 9</a:t>
+            </a:r>
+            <a:r>
+              <a:rPr lang="en-US" baseline="30000" dirty="0" smtClean="0"/>
+              <a:t>th</a:t>
+            </a:r>
+            <a:r>
+              <a:rPr lang="en-US" dirty="0" smtClean="0"/>
+              <a:t> of F)</a:t>
+            </a:r>
+          </a:p>
+          <a:p>
+            <a:endParaRPr lang="en-US" dirty="0" smtClean="0"/>
+          </a:p>
+          <a:p>
+            <a:r>
+              <a:rPr lang="en-US" dirty="0" smtClean="0"/>
+              <a:t>We replace the elements of A and B by Ai* and Bi*</a:t>
+            </a:r>
+          </a:p>
+          <a:p>
+            <a:pPr lvl="1"/>
+            <a:r>
+              <a:rPr lang="en-US" dirty="0" smtClean="0"/>
+              <a:t>A={4+sign(Average(A-B))*C*S/2),….}</a:t>
+            </a:r>
+          </a:p>
+          <a:p>
+            <a:pPr lvl="1"/>
+            <a:endParaRPr lang="en-US" dirty="0" smtClean="0"/>
+          </a:p>
+          <a:p>
+            <a:r>
+              <a:rPr lang="en-US" dirty="0" smtClean="0"/>
+              <a:t>We make the inverse operation, and replace the original F coefficient with the modified values</a:t>
+            </a:r>
+          </a:p>
+          <a:p>
+            <a:pPr lvl="1"/>
+            <a:r>
+              <a:rPr lang="en-US" dirty="0" smtClean="0"/>
+              <a:t>F={2,A1*,3,A2*,B1*,5,5,1,0,B2*,3,8}</a:t>
+            </a:r>
+          </a:p>
+          <a:p>
+            <a:endParaRPr lang="en-US" dirty="0" smtClean="0"/>
+          </a:p>
+          <a:p>
+            <a:pPr lvl="1">
+              <a:buNone/>
+            </a:pPr>
+            <a:endParaRPr lang="en-US" dirty="0" smtClean="0"/>
+          </a:p>
+        </p:txBody>
+      </p:sp>
+    </p:spTree>
+  </p:cSld>
+  <p:clrMapOvr>
+    <a:masterClrMapping/>
+  </p:clrMapOvr>
+</p:sld>
+</file>
+
+<file path=ppt/slides/slide11.xml><?xml version="1.0" encoding="utf-8"?>
+<p:sld xmlns:a="http://schemas.openxmlformats.org/drawingml/2006/main" xmlns:r="http://schemas.openxmlformats.org/officeDocument/2006/relationships" xmlns:p="http://schemas.openxmlformats.org/presentationml/2006/main">
+  <p:cSld>
+    <p:spTree>
+      <p:nvGrpSpPr>
+        <p:cNvPr id="1" name=""/>
+        <p:cNvGrpSpPr/>
+        <p:nvPr/>
+      </p:nvGrpSpPr>
+      <p:grpSpPr>
+        <a:xfrm>
+          <a:off x="0" y="0"/>
+          <a:ext cx="0" cy="0"/>
+          <a:chOff x="0" y="0"/>
+          <a:chExt cx="0" cy="0"/>
+        </a:xfrm>
+      </p:grpSpPr>
+      <p:sp>
+        <p:nvSpPr>
+          <p:cNvPr id="2" name="Titre 1"/>
+          <p:cNvSpPr>
+            <a:spLocks noGrp="1"/>
+          </p:cNvSpPr>
+          <p:nvPr>
+            <p:ph type="title"/>
+          </p:nvPr>
+        </p:nvSpPr>
+        <p:spPr/>
+        <p:txBody>
+          <a:bodyPr>
+            <a:normAutofit fontScale="90000"/>
+          </a:bodyPr>
+          <a:lstStyle/>
+          <a:p>
+            <a:r>
+              <a:rPr lang="en-US" dirty="0" smtClean="0"/>
+              <a:t>Implemented Algorithm for </a:t>
+            </a:r>
+            <a:r>
+              <a:rPr lang="en-US" dirty="0" err="1" smtClean="0"/>
+              <a:t>deembedding</a:t>
+            </a:r>
+            <a:r>
+              <a:rPr lang="en-US" dirty="0" smtClean="0"/>
+              <a:t> </a:t>
+            </a:r>
+            <a:endParaRPr lang="en-US" dirty="0"/>
+          </a:p>
+        </p:txBody>
+      </p:sp>
+      <p:sp>
+        <p:nvSpPr>
+          <p:cNvPr id="3" name="Espace réservé du contenu 2"/>
+          <p:cNvSpPr>
+            <a:spLocks noGrp="1"/>
+          </p:cNvSpPr>
+          <p:nvPr>
+            <p:ph sz="quarter" idx="1"/>
+          </p:nvPr>
+        </p:nvSpPr>
+        <p:spPr/>
+        <p:txBody>
+          <a:bodyPr/>
+          <a:lstStyle/>
+          <a:p>
+            <a:r>
+              <a:rPr lang="en-US" dirty="0" smtClean="0"/>
+              <a:t>Retrieve the modified DFT,DCT coefficient for the Index representing 0, and 1. A0 and B0 and A1 and B1.</a:t>
+            </a:r>
+          </a:p>
+          <a:p>
+            <a:endParaRPr lang="en-US" dirty="0" smtClean="0"/>
+          </a:p>
+          <a:p>
+            <a:r>
+              <a:rPr lang="en-US" dirty="0" smtClean="0"/>
+              <a:t>Compute the sample means  and pooled sample error (S0,S1) for A0,B0…</a:t>
+            </a:r>
+          </a:p>
+          <a:p>
+            <a:endParaRPr lang="en-US" dirty="0" smtClean="0"/>
+          </a:p>
+          <a:p>
+            <a:r>
+              <a:rPr lang="en-US" dirty="0" smtClean="0"/>
+              <a:t>See what for what set we get the biggest values T:</a:t>
+            </a:r>
+          </a:p>
+          <a:p>
+            <a:pPr lvl="1"/>
+            <a:r>
+              <a:rPr lang="en-US" dirty="0" smtClean="0"/>
+              <a:t>T0= (</a:t>
+            </a:r>
+            <a:r>
+              <a:rPr lang="en-US" dirty="0" err="1" smtClean="0"/>
+              <a:t>ave</a:t>
+            </a:r>
+            <a:r>
+              <a:rPr lang="en-US" dirty="0" smtClean="0"/>
+              <a:t>(A0)-</a:t>
+            </a:r>
+            <a:r>
+              <a:rPr lang="en-US" dirty="0" err="1" smtClean="0"/>
+              <a:t>ave</a:t>
+            </a:r>
+            <a:r>
+              <a:rPr lang="en-US" dirty="0" smtClean="0"/>
+              <a:t>(B0))² /S²0 or T1= (</a:t>
+            </a:r>
+            <a:r>
+              <a:rPr lang="en-US" dirty="0" err="1" smtClean="0"/>
+              <a:t>ave</a:t>
+            </a:r>
+            <a:r>
+              <a:rPr lang="en-US" dirty="0" smtClean="0"/>
+              <a:t>(A1)-</a:t>
+            </a:r>
+            <a:r>
+              <a:rPr lang="en-US" dirty="0" err="1" smtClean="0"/>
+              <a:t>ave</a:t>
+            </a:r>
+            <a:r>
+              <a:rPr lang="en-US" dirty="0" smtClean="0"/>
+              <a:t>(B1))² /S²1.</a:t>
+            </a:r>
+          </a:p>
+          <a:p>
+            <a:pPr lvl="1"/>
+            <a:endParaRPr lang="en-US" dirty="0" smtClean="0"/>
+          </a:p>
+          <a:p>
+            <a:r>
+              <a:rPr lang="en-US" dirty="0" smtClean="0"/>
+              <a:t>If T is bigger than a </a:t>
+            </a:r>
+            <a:r>
+              <a:rPr lang="en-US" dirty="0" err="1" smtClean="0"/>
+              <a:t>predecided</a:t>
+            </a:r>
+            <a:r>
+              <a:rPr lang="en-US" dirty="0" smtClean="0"/>
+              <a:t> threshold then we assume that the signal is watermarked.</a:t>
+            </a:r>
+          </a:p>
+          <a:p>
+            <a:endParaRPr lang="en-US" dirty="0" smtClean="0"/>
+          </a:p>
+          <a:p>
+            <a:endParaRPr lang="en-US" dirty="0" smtClean="0"/>
+          </a:p>
+          <a:p>
+            <a:endParaRPr lang="en-US" dirty="0" smtClean="0"/>
+          </a:p>
+          <a:p>
+            <a:endParaRPr lang="en-US" dirty="0" smtClean="0"/>
+          </a:p>
+          <a:p>
+            <a:endParaRPr lang="en-US" dirty="0"/>
+          </a:p>
+        </p:txBody>
+      </p:sp>
+    </p:spTree>
+  </p:cSld>
+  <p:clrMapOvr>
+    <a:masterClrMapping/>
+  </p:clrMapOvr>
+</p:sld>
+</file>
+
+<file path=ppt/slides/slide12.xml><?xml version="1.0" encoding="utf-8"?>
+<p:sld xmlns:a="http://schemas.openxmlformats.org/drawingml/2006/main" xmlns:r="http://schemas.openxmlformats.org/officeDocument/2006/relationships" xmlns:p="http://schemas.openxmlformats.org/presentationml/2006/main">
+  <p:cSld>
+    <p:spTree>
+      <p:nvGrpSpPr>
+        <p:cNvPr id="1" name=""/>
+        <p:cNvGrpSpPr/>
+        <p:nvPr/>
+      </p:nvGrpSpPr>
+      <p:grpSpPr>
+        <a:xfrm>
+          <a:off x="0" y="0"/>
+          <a:ext cx="0" cy="0"/>
+          <a:chOff x="0" y="0"/>
+          <a:chExt cx="0" cy="0"/>
+        </a:xfrm>
+      </p:grpSpPr>
+      <p:sp>
+        <p:nvSpPr>
+          <p:cNvPr id="2" name="Titre 1"/>
+          <p:cNvSpPr>
+            <a:spLocks noGrp="1"/>
+          </p:cNvSpPr>
+          <p:nvPr>
+            <p:ph type="title"/>
+          </p:nvPr>
+        </p:nvSpPr>
+        <p:spPr/>
+        <p:txBody>
+          <a:bodyPr/>
+          <a:lstStyle/>
+          <a:p>
+            <a:r>
+              <a:rPr lang="en-US" dirty="0" smtClean="0"/>
+              <a:t>Summarize: What I Have done so far ?</a:t>
+            </a:r>
+            <a:endParaRPr lang="en-US" dirty="0"/>
+          </a:p>
+        </p:txBody>
+      </p:sp>
+      <p:sp>
+        <p:nvSpPr>
+          <p:cNvPr id="3" name="Espace réservé du contenu 2"/>
+          <p:cNvSpPr>
+            <a:spLocks noGrp="1"/>
+          </p:cNvSpPr>
+          <p:nvPr>
+            <p:ph sz="quarter" idx="1"/>
+          </p:nvPr>
+        </p:nvSpPr>
         <p:spPr/>
         <p:txBody>
           <a:bodyPr>
@@ -4003,6 +4403,165 @@
           </a:p>
           <a:p>
             <a:endParaRPr lang="en-US" dirty="0" smtClean="0"/>
+          </a:p>
+        </p:txBody>
+      </p:sp>
+    </p:spTree>
+  </p:cSld>
+  <p:clrMapOvr>
+    <a:masterClrMapping/>
+  </p:clrMapOvr>
+</p:sld>
+</file>
+
+<file path=ppt/slides/slide13.xml><?xml version="1.0" encoding="utf-8"?>
+<p:sld xmlns:a="http://schemas.openxmlformats.org/drawingml/2006/main" xmlns:r="http://schemas.openxmlformats.org/officeDocument/2006/relationships" xmlns:p="http://schemas.openxmlformats.org/presentationml/2006/main">
+  <p:cSld>
+    <p:spTree>
+      <p:nvGrpSpPr>
+        <p:cNvPr id="1" name=""/>
+        <p:cNvGrpSpPr/>
+        <p:nvPr/>
+      </p:nvGrpSpPr>
+      <p:grpSpPr>
+        <a:xfrm>
+          <a:off x="0" y="0"/>
+          <a:ext cx="0" cy="0"/>
+          <a:chOff x="0" y="0"/>
+          <a:chExt cx="0" cy="0"/>
+        </a:xfrm>
+      </p:grpSpPr>
+      <p:sp>
+        <p:nvSpPr>
+          <p:cNvPr id="2" name="Titre 1"/>
+          <p:cNvSpPr>
+            <a:spLocks noGrp="1"/>
+          </p:cNvSpPr>
+          <p:nvPr>
+            <p:ph type="title"/>
+          </p:nvPr>
+        </p:nvSpPr>
+        <p:spPr/>
+        <p:txBody>
+          <a:bodyPr>
+            <a:normAutofit fontScale="90000"/>
+          </a:bodyPr>
+          <a:lstStyle/>
+          <a:p>
+            <a:r>
+              <a:rPr lang="en-US" dirty="0" smtClean="0"/>
+              <a:t/>
+            </a:r>
+            <a:br>
+              <a:rPr lang="en-US" dirty="0" smtClean="0"/>
+            </a:br>
+            <a:r>
+              <a:rPr lang="en-US" dirty="0" smtClean="0"/>
+              <a:t/>
+            </a:r>
+            <a:br>
+              <a:rPr lang="en-US" dirty="0" smtClean="0"/>
+            </a:br>
+            <a:r>
+              <a:rPr lang="en-US" dirty="0" smtClean="0"/>
+              <a:t>Summarize: Still need to do ?	</a:t>
+            </a:r>
+            <a:endParaRPr lang="en-US" dirty="0"/>
+          </a:p>
+        </p:txBody>
+      </p:sp>
+      <p:sp>
+        <p:nvSpPr>
+          <p:cNvPr id="3" name="Espace réservé du contenu 2"/>
+          <p:cNvSpPr>
+            <a:spLocks noGrp="1"/>
+          </p:cNvSpPr>
+          <p:nvPr>
+            <p:ph sz="quarter" idx="1"/>
+          </p:nvPr>
+        </p:nvSpPr>
+        <p:spPr/>
+        <p:txBody>
+          <a:bodyPr/>
+          <a:lstStyle/>
+          <a:p>
+            <a:r>
+              <a:rPr lang="en-US" dirty="0" smtClean="0"/>
+              <a:t>Explain why the algorithm works well</a:t>
+            </a:r>
+          </a:p>
+          <a:p>
+            <a:endParaRPr lang="en-US" dirty="0" smtClean="0"/>
+          </a:p>
+          <a:p>
+            <a:r>
+              <a:rPr lang="en-US" dirty="0" smtClean="0"/>
+              <a:t>Does it satisfy the conditions</a:t>
+            </a:r>
+          </a:p>
+          <a:p>
+            <a:pPr lvl="1"/>
+            <a:r>
+              <a:rPr lang="en-US" dirty="0" smtClean="0"/>
+              <a:t>Transparency</a:t>
+            </a:r>
+          </a:p>
+          <a:p>
+            <a:pPr lvl="1"/>
+            <a:r>
+              <a:rPr lang="en-US" dirty="0" smtClean="0"/>
+              <a:t>Robust to pitch </a:t>
+            </a:r>
+            <a:r>
+              <a:rPr lang="en-US" dirty="0" err="1" smtClean="0"/>
+              <a:t>distorsion</a:t>
+            </a:r>
+            <a:r>
+              <a:rPr lang="en-US" dirty="0" smtClean="0"/>
+              <a:t>, </a:t>
+            </a:r>
+            <a:r>
+              <a:rPr lang="en-US" dirty="0" err="1" smtClean="0"/>
+              <a:t>passband</a:t>
+            </a:r>
+            <a:r>
+              <a:rPr lang="en-US" dirty="0" smtClean="0"/>
+              <a:t> filter…</a:t>
+            </a:r>
+          </a:p>
+          <a:p>
+            <a:pPr lvl="1"/>
+            <a:r>
+              <a:rPr lang="en-US" dirty="0" smtClean="0"/>
+              <a:t>Secure</a:t>
+            </a:r>
+          </a:p>
+          <a:p>
+            <a:pPr lvl="1"/>
+            <a:r>
+              <a:rPr lang="en-US" dirty="0" smtClean="0"/>
+              <a:t>Statistically Undetectable</a:t>
+            </a:r>
+          </a:p>
+          <a:p>
+            <a:pPr lvl="1"/>
+            <a:r>
+              <a:rPr lang="en-US" dirty="0" err="1" smtClean="0"/>
+              <a:t>Comparaisons</a:t>
+            </a:r>
+            <a:r>
+              <a:rPr lang="en-US" dirty="0" smtClean="0"/>
+              <a:t> between Watermarking </a:t>
+            </a:r>
+            <a:r>
+              <a:rPr lang="en-US" dirty="0" err="1" smtClean="0"/>
+              <a:t>applicated</a:t>
+            </a:r>
+            <a:r>
+              <a:rPr lang="en-US" dirty="0" smtClean="0"/>
+              <a:t> to speech and music.</a:t>
+            </a:r>
+            <a:endParaRPr lang="en-US" dirty="0"/>
           </a:p>
         </p:txBody>
       </p:sp>
@@ -4104,8 +4663,9 @@
             <a:pPr lvl="1"/>
             <a:r>
               <a:rPr lang="en-US" dirty="0" smtClean="0"/>
-              <a:t>Rely to a key to ensure security</a:t>
-            </a:r>
+              <a:t>Security</a:t>
+            </a:r>
+            <a:endParaRPr lang="en-US" dirty="0" smtClean="0"/>
           </a:p>
           <a:p>
             <a:pPr lvl="1"/>
@@ -4224,6 +4784,114 @@
 </file>
 
 <file path=ppt/slides/slide4.xml><?xml version="1.0" encoding="utf-8"?>
+<p:sld xmlns:a="http://schemas.openxmlformats.org/drawingml/2006/main" xmlns:r="http://schemas.openxmlformats.org/officeDocument/2006/relationships" xmlns:p="http://schemas.openxmlformats.org/presentationml/2006/main">
+  <p:cSld>
+    <p:spTree>
+      <p:nvGrpSpPr>
+        <p:cNvPr id="1" name=""/>
+        <p:cNvGrpSpPr/>
+        <p:nvPr/>
+      </p:nvGrpSpPr>
+      <p:grpSpPr>
+        <a:xfrm>
+          <a:off x="0" y="0"/>
+          <a:ext cx="0" cy="0"/>
+          <a:chOff x="0" y="0"/>
+          <a:chExt cx="0" cy="0"/>
+        </a:xfrm>
+      </p:grpSpPr>
+      <p:sp>
+        <p:nvSpPr>
+          <p:cNvPr id="2" name="Titre 1"/>
+          <p:cNvSpPr>
+            <a:spLocks noGrp="1"/>
+          </p:cNvSpPr>
+          <p:nvPr>
+            <p:ph type="title"/>
+          </p:nvPr>
+        </p:nvSpPr>
+        <p:spPr/>
+        <p:txBody>
+          <a:bodyPr/>
+          <a:lstStyle/>
+          <a:p>
+            <a:r>
+              <a:rPr lang="en-US" dirty="0" smtClean="0"/>
+              <a:t>Patchwork algorithm definition</a:t>
+            </a:r>
+            <a:endParaRPr lang="en-US" dirty="0"/>
+          </a:p>
+        </p:txBody>
+      </p:sp>
+      <p:sp>
+        <p:nvSpPr>
+          <p:cNvPr id="3" name="Espace réservé du contenu 2"/>
+          <p:cNvSpPr>
+            <a:spLocks noGrp="1"/>
+          </p:cNvSpPr>
+          <p:nvPr>
+            <p:ph sz="quarter" idx="1"/>
+          </p:nvPr>
+        </p:nvSpPr>
+        <p:spPr/>
+        <p:txBody>
+          <a:bodyPr/>
+          <a:lstStyle/>
+          <a:p>
+            <a:r>
+              <a:rPr lang="en-US" dirty="0" smtClean="0"/>
+              <a:t>We modified two “patchwork” of an image/audio file </a:t>
+            </a:r>
+            <a:endParaRPr lang="en-US" dirty="0" smtClean="0"/>
+          </a:p>
+          <a:p>
+            <a:endParaRPr lang="en-US" dirty="0" smtClean="0"/>
+          </a:p>
+          <a:p>
+            <a:r>
+              <a:rPr lang="en-US" dirty="0" smtClean="0"/>
+              <a:t>We retrieve the information by calculating the difference between the two </a:t>
+            </a:r>
+            <a:r>
+              <a:rPr lang="en-US" dirty="0" err="1" smtClean="0"/>
+              <a:t>patchorwk</a:t>
+            </a:r>
+            <a:r>
+              <a:rPr lang="en-US" dirty="0" smtClean="0"/>
+              <a:t>.</a:t>
+            </a:r>
+          </a:p>
+          <a:p>
+            <a:endParaRPr lang="en-US" dirty="0" smtClean="0"/>
+          </a:p>
+          <a:p>
+            <a:r>
+              <a:rPr lang="en-US" dirty="0" smtClean="0"/>
+              <a:t>The patchworks are randomly chosen, and we have to keep the memory of the Patchwork in order to reconstruct the </a:t>
+            </a:r>
+            <a:r>
+              <a:rPr lang="en-US" dirty="0" err="1" smtClean="0"/>
+              <a:t>embeded</a:t>
+            </a:r>
+            <a:r>
+              <a:rPr lang="en-US" dirty="0" smtClean="0"/>
+              <a:t> data.</a:t>
+            </a:r>
+          </a:p>
+          <a:p>
+            <a:endParaRPr lang="en-US" dirty="0"/>
+          </a:p>
+        </p:txBody>
+      </p:sp>
+    </p:spTree>
+  </p:cSld>
+  <p:clrMapOvr>
+    <a:masterClrMapping/>
+  </p:clrMapOvr>
+</p:sld>
+</file>
+
+<file path=ppt/slides/slide5.xml><?xml version="1.0" encoding="utf-8"?>
 <p:sld xmlns:a="http://schemas.openxmlformats.org/drawingml/2006/main" xmlns:r="http://schemas.openxmlformats.org/officeDocument/2006/relationships" xmlns:p="http://schemas.openxmlformats.org/presentationml/2006/main">
   <p:cSld>
     <p:spTree>
@@ -7389,7 +8057,7 @@
 </p:sld>
 </file>
 
-<file path=ppt/slides/slide5.xml><?xml version="1.0" encoding="utf-8"?>
+<file path=ppt/slides/slide6.xml><?xml version="1.0" encoding="utf-8"?>
 <p:sld xmlns:a="http://schemas.openxmlformats.org/drawingml/2006/main" xmlns:r="http://schemas.openxmlformats.org/officeDocument/2006/relationships" xmlns:p="http://schemas.openxmlformats.org/presentationml/2006/main">
   <p:cSld>
     <p:spTree>
@@ -8204,7 +8872,7 @@
                     <a:bodyPr/>
                     <a:lstStyle/>
                     <a:p>
-                      <a:endParaRPr lang="en-US"/>
+                      <a:endParaRPr lang="en-US" dirty="0"/>
                     </a:p>
                   </a:txBody>
                   <a:tcPr>
@@ -8862,7 +9530,6 @@
               <a:rPr lang="en-US" dirty="0" smtClean="0"/>
               <a:t>E[A*-B* ]= 2d</a:t>
             </a:r>
-            <a:endParaRPr lang="en-US" dirty="0" smtClean="0"/>
           </a:p>
           <a:p>
             <a:r>
@@ -8886,136 +9553,31 @@
           </a:p>
         </p:txBody>
       </p:sp>
-    </p:spTree>
-  </p:cSld>
-  <p:clrMapOvr>
-    <a:masterClrMapping/>
-  </p:clrMapOvr>
-</p:sld>
-</file>
-
-<file path=ppt/slides/slide6.xml><?xml version="1.0" encoding="utf-8"?>
-<p:sld xmlns:a="http://schemas.openxmlformats.org/drawingml/2006/main" xmlns:r="http://schemas.openxmlformats.org/officeDocument/2006/relationships" xmlns:p="http://schemas.openxmlformats.org/presentationml/2006/main">
-  <p:cSld>
-    <p:spTree>
-      <p:nvGrpSpPr>
-        <p:cNvPr id="1" name=""/>
-        <p:cNvGrpSpPr/>
-        <p:nvPr/>
-      </p:nvGrpSpPr>
-      <p:grpSpPr>
-        <a:xfrm>
-          <a:off x="0" y="0"/>
-          <a:ext cx="0" cy="0"/>
-          <a:chOff x="0" y="0"/>
-          <a:chExt cx="0" cy="0"/>
-        </a:xfrm>
-      </p:grpSpPr>
-      <p:sp>
-        <p:nvSpPr>
-          <p:cNvPr id="2" name="Titre 1"/>
-          <p:cNvSpPr>
-            <a:spLocks noGrp="1"/>
-          </p:cNvSpPr>
-          <p:nvPr>
-            <p:ph type="title"/>
-          </p:nvPr>
-        </p:nvSpPr>
-        <p:spPr/>
-        <p:txBody>
-          <a:bodyPr>
-            <a:normAutofit fontScale="90000"/>
+      <p:sp>
+        <p:nvSpPr>
+          <p:cNvPr id="7" name="ZoneTexte 6"/>
+          <p:cNvSpPr txBox="1"/>
+          <p:nvPr/>
+        </p:nvSpPr>
+        <p:spPr>
+          <a:xfrm>
+            <a:off x="4429124" y="5072074"/>
+            <a:ext cx="4429156" cy="646331"/>
+          </a:xfrm>
+          <a:prstGeom prst="rect">
+            <a:avLst/>
+          </a:prstGeom>
+          <a:noFill/>
+        </p:spPr>
+        <p:txBody>
+          <a:bodyPr wrap="square" rtlCol="0">
+            <a:spAutoFit/>
           </a:bodyPr>
           <a:lstStyle/>
           <a:p>
             <a:r>
               <a:rPr lang="en-US" dirty="0" smtClean="0"/>
-              <a:t>Audio watermarking = same ideas but </a:t>
-            </a:r>
-            <a:r>
-              <a:rPr lang="en-US" dirty="0" err="1" smtClean="0"/>
-              <a:t>differencies</a:t>
-            </a:r>
-            <a:endParaRPr lang="en-US" dirty="0"/>
-          </a:p>
-        </p:txBody>
-      </p:sp>
-      <p:sp>
-        <p:nvSpPr>
-          <p:cNvPr id="3" name="Espace réservé du contenu 2"/>
-          <p:cNvSpPr>
-            <a:spLocks noGrp="1"/>
-          </p:cNvSpPr>
-          <p:nvPr>
-            <p:ph sz="quarter" idx="1"/>
-          </p:nvPr>
-        </p:nvSpPr>
-        <p:spPr/>
-        <p:txBody>
-          <a:bodyPr/>
-          <a:lstStyle/>
-          <a:p>
-            <a:r>
-              <a:rPr lang="en-US" dirty="0" smtClean="0"/>
-              <a:t>Patchwork algorithm </a:t>
-            </a:r>
-            <a:r>
-              <a:rPr lang="en-US" dirty="0" err="1" smtClean="0"/>
-              <a:t>applicated</a:t>
-            </a:r>
-            <a:r>
-              <a:rPr lang="en-US" dirty="0" smtClean="0"/>
-              <a:t> to the frequency domain</a:t>
-            </a:r>
-          </a:p>
-          <a:p>
-            <a:endParaRPr lang="en-US" dirty="0" smtClean="0"/>
-          </a:p>
-          <a:p>
-            <a:r>
-              <a:rPr lang="en-US" dirty="0" smtClean="0"/>
-              <a:t>We use mean and variance to detect the watermarks</a:t>
-            </a:r>
-          </a:p>
-          <a:p>
-            <a:endParaRPr lang="en-US" dirty="0" smtClean="0"/>
-          </a:p>
-          <a:p>
-            <a:r>
-              <a:rPr lang="en-US" dirty="0" smtClean="0"/>
-              <a:t>Assume that the Distribution of the sample is </a:t>
-            </a:r>
-            <a:r>
-              <a:rPr lang="en-US" dirty="0" err="1" smtClean="0"/>
-              <a:t>gaussian</a:t>
-            </a:r>
-            <a:endParaRPr lang="en-US" dirty="0" smtClean="0"/>
-          </a:p>
-          <a:p>
-            <a:endParaRPr lang="en-US" dirty="0" smtClean="0"/>
-          </a:p>
-          <a:p>
-            <a:r>
-              <a:rPr lang="en-US" dirty="0" smtClean="0"/>
-              <a:t>We use A*=A(1+d) instead of A*=</a:t>
-            </a:r>
-            <a:r>
-              <a:rPr lang="en-US" dirty="0" err="1" smtClean="0"/>
-              <a:t>A+d</a:t>
-            </a:r>
-            <a:endParaRPr lang="en-US" dirty="0" smtClean="0"/>
-          </a:p>
-          <a:p>
-            <a:endParaRPr lang="en-US" dirty="0" smtClean="0"/>
-          </a:p>
-          <a:p>
-            <a:r>
-              <a:rPr lang="en-US" dirty="0" smtClean="0"/>
-              <a:t> </a:t>
-            </a:r>
-            <a:r>
-              <a:rPr lang="en-US" dirty="0" smtClean="0"/>
-              <a:t>d is decided adaptively.</a:t>
+              <a:t>But: don’t work very well for audio signal.  Very sensitive to the modification.</a:t>
             </a:r>
             <a:endParaRPr lang="en-US" dirty="0"/>
           </a:p>
@@ -9058,12 +9620,18 @@
         </p:nvSpPr>
         <p:spPr/>
         <p:txBody>
-          <a:bodyPr/>
+          <a:bodyPr>
+            <a:normAutofit fontScale="90000"/>
+          </a:bodyPr>
           <a:lstStyle/>
           <a:p>
             <a:r>
               <a:rPr lang="en-US" dirty="0" smtClean="0"/>
-              <a:t>Implemented Algorithm for embedding</a:t>
+              <a:t>Audio watermarking = same ideas but </a:t>
+            </a:r>
+            <a:r>
+              <a:rPr lang="en-US" dirty="0" err="1" smtClean="0"/>
+              <a:t>differencies</a:t>
             </a:r>
             <a:endParaRPr lang="en-US" dirty="0"/>
           </a:p>
@@ -9086,7 +9654,15 @@
           <a:p>
             <a:r>
               <a:rPr lang="en-US" dirty="0" smtClean="0"/>
-              <a:t>Apply a DFT, or DCT of size N on an audio frame an store the coefficients F.</a:t>
+              <a:t>Patchwork algorithm </a:t>
+            </a:r>
+            <a:r>
+              <a:rPr lang="en-US" dirty="0" err="1" smtClean="0"/>
+              <a:t>applicated</a:t>
+            </a:r>
+            <a:r>
+              <a:rPr lang="en-US" dirty="0" smtClean="0"/>
+              <a:t> to the frequency domain</a:t>
             </a:r>
           </a:p>
           <a:p>
@@ -9095,7 +9671,7 @@
           <a:p>
             <a:r>
               <a:rPr lang="en-US" dirty="0" smtClean="0"/>
-              <a:t>From a secret key, generate 2 Index with  2 n values pseudo-randomly chosen between 1 and N. Each index will represented 0 or 1.</a:t>
+              <a:t>We use mean and variance to detect the watermarks</a:t>
             </a:r>
           </a:p>
           <a:p>
@@ -9104,7 +9680,11 @@
           <a:p>
             <a:r>
               <a:rPr lang="en-US" dirty="0" smtClean="0"/>
-              <a:t>Define the subset A and B, with A=[ F coefficients with subset equals to the first n elements of the Index of the desired values] . Same for B with the last n elements.</a:t>
+              <a:t>Assume that the Distribution of the sample is </a:t>
+            </a:r>
+            <a:r>
+              <a:rPr lang="en-US" dirty="0" err="1" smtClean="0"/>
+              <a:t>gaussian</a:t>
             </a:r>
             <a:endParaRPr lang="en-US" dirty="0" smtClean="0"/>
           </a:p>
@@ -9112,15 +9692,24 @@
             <a:endParaRPr lang="en-US" dirty="0" smtClean="0"/>
           </a:p>
           <a:p>
+            <a:r>
+              <a:rPr lang="en-US" dirty="0" smtClean="0"/>
+              <a:t>We use A*=A(1+d) instead of A*=</a:t>
+            </a:r>
+            <a:r>
+              <a:rPr lang="en-US" dirty="0" err="1" smtClean="0"/>
+              <a:t>A+d</a:t>
+            </a:r>
             <a:endParaRPr lang="en-US" dirty="0" smtClean="0"/>
           </a:p>
           <a:p>
             <a:endParaRPr lang="en-US" dirty="0" smtClean="0"/>
           </a:p>
           <a:p>
-            <a:endParaRPr lang="en-US" dirty="0" smtClean="0"/>
-          </a:p>
-          <a:p>
+            <a:r>
+              <a:rPr lang="en-US" dirty="0" smtClean="0"/>
+              <a:t> d is decided adaptively.</a:t>
+            </a:r>
             <a:endParaRPr lang="en-US" dirty="0"/>
           </a:p>
         </p:txBody>
@@ -9162,18 +9751,12 @@
         </p:nvSpPr>
         <p:spPr/>
         <p:txBody>
-          <a:bodyPr>
-            <a:normAutofit fontScale="90000"/>
-          </a:bodyPr>
+          <a:bodyPr/>
           <a:lstStyle/>
           <a:p>
             <a:r>
               <a:rPr lang="en-US" dirty="0" smtClean="0"/>
-              <a:t>Implemented Algorithm for </a:t>
-            </a:r>
-            <a:r>
-              <a:rPr lang="en-US" dirty="0" smtClean="0"/>
-              <a:t>embedding (cont’d)</a:t>
+              <a:t>Implemented Algorithm for embedding</a:t>
             </a:r>
             <a:endParaRPr lang="en-US" dirty="0"/>
           </a:p>
@@ -9196,7 +9779,7 @@
           <a:p>
             <a:r>
               <a:rPr lang="en-US" dirty="0" smtClean="0"/>
-              <a:t>Calculate the mean and the pooled sample standard error S of elements of A and B.</a:t>
+              <a:t>Apply a DFT, or DCT of size N on an audio frame an store the coefficients F.</a:t>
             </a:r>
           </a:p>
           <a:p>
@@ -9205,35 +9788,31 @@
           <a:p>
             <a:r>
               <a:rPr lang="en-US" dirty="0" smtClean="0"/>
-              <a:t>Replace them by Ai*=Ai + sign(average(A-B))* C * S/2</a:t>
-            </a:r>
-          </a:p>
-          <a:p>
-            <a:pPr lvl="1"/>
-            <a:r>
-              <a:rPr lang="en-US" dirty="0" smtClean="0"/>
-              <a:t>C is a constant</a:t>
-            </a:r>
-          </a:p>
-          <a:p>
-            <a:pPr lvl="1"/>
+              <a:t>From a secret key, generate 2 Index with  2 n values pseudo-randomly chosen between 1 and N. Each index will represented 0 or 1.</a:t>
+            </a:r>
+          </a:p>
+          <a:p>
             <a:endParaRPr lang="en-US" dirty="0" smtClean="0"/>
           </a:p>
           <a:p>
-            <a:pPr lvl="1"/>
+            <a:r>
+              <a:rPr lang="en-US" dirty="0" smtClean="0"/>
+              <a:t>Define the subset A and B, with A=[ F coefficients with subset equals to the first n elements of the Index of the desired values] . Same for B with the last n elements.</a:t>
+            </a:r>
+          </a:p>
+          <a:p>
             <a:endParaRPr lang="en-US" dirty="0" smtClean="0"/>
           </a:p>
           <a:p>
-            <a:r>
-              <a:rPr lang="en-US" dirty="0" smtClean="0"/>
-              <a:t>Apply the inverse DCT. The signal is watermarked.</a:t>
-            </a:r>
             <a:endParaRPr lang="en-US" dirty="0" smtClean="0"/>
           </a:p>
           <a:p>
-            <a:pPr lvl="1">
-              <a:buNone/>
-            </a:pPr>
+            <a:endParaRPr lang="en-US" dirty="0" smtClean="0"/>
+          </a:p>
+          <a:p>
+            <a:endParaRPr lang="en-US" dirty="0" smtClean="0"/>
+          </a:p>
+          <a:p>
             <a:endParaRPr lang="en-US" dirty="0"/>
           </a:p>
         </p:txBody>
@@ -9282,15 +9861,7 @@
           <a:p>
             <a:r>
               <a:rPr lang="en-US" dirty="0" smtClean="0"/>
-              <a:t>Implemented Algorithm for </a:t>
-            </a:r>
-            <a:r>
-              <a:rPr lang="en-US" dirty="0" err="1" smtClean="0"/>
-              <a:t>deembedding</a:t>
-            </a:r>
-            <a:r>
-              <a:rPr lang="en-US" dirty="0" smtClean="0"/>
-              <a:t> </a:t>
+              <a:t>Implemented Algorithm for embedding (cont’d)</a:t>
             </a:r>
             <a:endParaRPr lang="en-US" dirty="0"/>
           </a:p>
@@ -9313,7 +9884,7 @@
           <a:p>
             <a:r>
               <a:rPr lang="en-US" dirty="0" smtClean="0"/>
-              <a:t>Retrieve the modified DFT,DCT coefficient for the Index representing 0, and 1. A0 and B0 and A1 and B1.</a:t>
+              <a:t>Calculate the mean and the pooled sample standard error S of elements of A and B.</a:t>
             </a:r>
           </a:p>
           <a:p>
@@ -9322,67 +9893,32 @@
           <a:p>
             <a:r>
               <a:rPr lang="en-US" dirty="0" smtClean="0"/>
-              <a:t>Compute the sample means  and pooled sample error (S0,S1) for A0,B0…</a:t>
-            </a:r>
-          </a:p>
-          <a:p>
-            <a:endParaRPr lang="en-US" dirty="0" smtClean="0"/>
-          </a:p>
-          <a:p>
-            <a:r>
-              <a:rPr lang="en-US" dirty="0" smtClean="0"/>
-              <a:t>See what for what set we get the biggest values T:</a:t>
+              <a:t>Replace them by Ai*=Ai + sign(average(A-B))* C * S/2</a:t>
             </a:r>
           </a:p>
           <a:p>
             <a:pPr lvl="1"/>
             <a:r>
               <a:rPr lang="en-US" dirty="0" smtClean="0"/>
-              <a:t>T0= (</a:t>
-            </a:r>
-            <a:r>
-              <a:rPr lang="en-US" dirty="0" err="1" smtClean="0"/>
-              <a:t>ave</a:t>
-            </a:r>
-            <a:r>
-              <a:rPr lang="en-US" dirty="0" smtClean="0"/>
-              <a:t>(A0)-</a:t>
-            </a:r>
-            <a:r>
-              <a:rPr lang="en-US" dirty="0" err="1" smtClean="0"/>
-              <a:t>ave</a:t>
-            </a:r>
-            <a:r>
-              <a:rPr lang="en-US" dirty="0" smtClean="0"/>
-              <a:t>(B0))² /S²0 or T1= </a:t>
-            </a:r>
-            <a:r>
-              <a:rPr lang="en-US" dirty="0" smtClean="0"/>
-              <a:t>(</a:t>
-            </a:r>
-            <a:r>
-              <a:rPr lang="en-US" dirty="0" err="1" smtClean="0"/>
-              <a:t>ave</a:t>
-            </a:r>
-            <a:r>
-              <a:rPr lang="en-US" dirty="0" smtClean="0"/>
-              <a:t>(A1)-</a:t>
-            </a:r>
-            <a:r>
-              <a:rPr lang="en-US" dirty="0" err="1" smtClean="0"/>
-              <a:t>ave</a:t>
-            </a:r>
-            <a:r>
-              <a:rPr lang="en-US" dirty="0" smtClean="0"/>
-              <a:t>(B1))</a:t>
-            </a:r>
-            <a:r>
-              <a:rPr lang="en-US" dirty="0" smtClean="0"/>
-              <a:t>² /</a:t>
-            </a:r>
-            <a:r>
-              <a:rPr lang="en-US" dirty="0" smtClean="0"/>
-              <a:t>S²1.</a:t>
+              <a:t>C is a </a:t>
+            </a:r>
+            <a:r>
+              <a:rPr lang="en-US" dirty="0" smtClean="0"/>
+              <a:t>constant</a:t>
+            </a:r>
+          </a:p>
+          <a:p>
+            <a:pPr lvl="1"/>
+            <a:r>
+              <a:rPr lang="en-US" dirty="0" smtClean="0"/>
+              <a:t>Make the large value set larger, and small value set smaller</a:t>
+            </a:r>
+          </a:p>
+          <a:p>
+            <a:pPr lvl="1"/>
+            <a:r>
+              <a:rPr lang="en-US" dirty="0" smtClean="0"/>
+              <a:t>The distance between two sample is always bigger than square(C ) *S</a:t>
             </a:r>
             <a:endParaRPr lang="en-US" dirty="0" smtClean="0"/>
           </a:p>
@@ -9391,33 +9927,19 @@
             <a:endParaRPr lang="en-US" dirty="0" smtClean="0"/>
           </a:p>
           <a:p>
-            <a:r>
-              <a:rPr lang="en-US" dirty="0" smtClean="0"/>
-              <a:t>If T is bigger than a </a:t>
-            </a:r>
-            <a:r>
-              <a:rPr lang="en-US" dirty="0" err="1" smtClean="0"/>
-              <a:t>predecided</a:t>
-            </a:r>
-            <a:r>
-              <a:rPr lang="en-US" dirty="0" smtClean="0"/>
-              <a:t> threshold then we assume that the signal is watermarked.</a:t>
-            </a:r>
+            <a:pPr lvl="1"/>
             <a:endParaRPr lang="en-US" dirty="0" smtClean="0"/>
           </a:p>
           <a:p>
-            <a:endParaRPr lang="en-US" dirty="0" smtClean="0"/>
-          </a:p>
-          <a:p>
-            <a:endParaRPr lang="en-US" dirty="0" smtClean="0"/>
-          </a:p>
-          <a:p>
-            <a:endParaRPr lang="en-US" dirty="0" smtClean="0"/>
-          </a:p>
-          <a:p>
-            <a:endParaRPr lang="en-US" dirty="0" smtClean="0"/>
-          </a:p>
-          <a:p>
+            <a:r>
+              <a:rPr lang="en-US" dirty="0" smtClean="0"/>
+              <a:t>Apply the inverse DCT. The signal is watermarked.</a:t>
+            </a:r>
+          </a:p>
+          <a:p>
+            <a:pPr lvl="1">
+              <a:buNone/>
+            </a:pPr>
             <a:endParaRPr lang="en-US" dirty="0"/>
           </a:p>
         </p:txBody>

</xml_diff>